<commit_message>
updated alignment & fonts
</commit_message>
<xml_diff>
--- a/poster/poster2.pptx
+++ b/poster/poster2.pptx
@@ -13402,7 +13402,7 @@
                 <a:solidFill>
                   <a:srgbClr val="000760"/>
                 </a:solidFill>
-                <a:latin typeface="Roboto" panose="02000000000000000000" pitchFamily="2" charset="0"/>
+                <a:latin typeface="Montserrat Semi Bold" panose="00000700000000000000" pitchFamily="50" charset="0"/>
                 <a:ea typeface="Roboto" panose="02000000000000000000" pitchFamily="2" charset="0"/>
               </a:rPr>
               <a:t>Dynamic A*</a:t>
@@ -13440,13 +13440,13 @@
           <a:p>
             <a:pPr algn="ctr"/>
             <a:r>
-              <a:rPr lang="en-IN" sz="2500" b="1" dirty="0">
+              <a:rPr lang="en-IN" sz="2500" dirty="0">
                 <a:solidFill>
                   <a:schemeClr val="accent4">
                     <a:lumMod val="75000"/>
                   </a:schemeClr>
                 </a:solidFill>
-                <a:latin typeface="Roboto" panose="02000000000000000000" pitchFamily="2" charset="0"/>
+                <a:latin typeface="Montserrat Semi Bold" panose="00000700000000000000" pitchFamily="50" charset="0"/>
                 <a:ea typeface="Roboto" panose="02000000000000000000" pitchFamily="2" charset="0"/>
               </a:rPr>
               <a:t>Static A*</a:t>
@@ -13703,13 +13703,13 @@
           <p:nvPr/>
         </p:nvPicPr>
         <p:blipFill>
-          <a:blip r:embed="rId18">
+          <a:blip r:embed="rId14">
             <a:extLst>
               <a:ext uri="{28A0092B-C50C-407E-A947-70E740481C1C}">
                 <a14:useLocalDpi xmlns:a14="http://schemas.microsoft.com/office/drawing/2010/main" val="0"/>
               </a:ext>
               <a:ext uri="{96DAC541-7B7A-43D3-8B79-37D633B846F1}">
-                <asvg:svgBlip xmlns:asvg="http://schemas.microsoft.com/office/drawing/2016/SVG/main" r:embed="rId19"/>
+                <asvg:svgBlip xmlns:asvg="http://schemas.microsoft.com/office/drawing/2016/SVG/main" r:embed="rId15"/>
               </a:ext>
             </a:extLst>
           </a:blip>
@@ -13905,7 +13905,7 @@
           <a:lstStyle/>
           <a:p>
             <a:pPr algn="ctr"/>
-            <a:endParaRPr lang="en-IN"/>
+            <a:endParaRPr lang="en-IN" dirty="0"/>
           </a:p>
         </p:txBody>
       </p:sp>
@@ -14289,8 +14289,8 @@
         </p:nvSpPr>
         <p:spPr>
           <a:xfrm>
-            <a:off x="7185404" y="28578300"/>
-            <a:ext cx="877171" cy="369204"/>
+            <a:off x="6801535" y="28517689"/>
+            <a:ext cx="1213062" cy="461665"/>
           </a:xfrm>
           <a:prstGeom prst="rect">
             <a:avLst/>
@@ -14304,7 +14304,7 @@
           <a:lstStyle/>
           <a:p>
             <a:r>
-              <a:rPr lang="en-IN" b="1" dirty="0">
+              <a:rPr lang="en-IN" sz="2400" b="1" dirty="0">
                 <a:solidFill>
                   <a:srgbClr val="02785F"/>
                 </a:solidFill>
@@ -14331,8 +14331,8 @@
         </p:nvSpPr>
         <p:spPr>
           <a:xfrm>
-            <a:off x="1756423" y="31144583"/>
-            <a:ext cx="828705" cy="369204"/>
+            <a:off x="1490558" y="31042078"/>
+            <a:ext cx="916264" cy="461665"/>
           </a:xfrm>
           <a:prstGeom prst="rect">
             <a:avLst/>
@@ -14346,7 +14346,7 @@
           <a:lstStyle/>
           <a:p>
             <a:r>
-              <a:rPr lang="en-IN" b="1" dirty="0">
+              <a:rPr lang="en-IN" sz="2400" b="1" dirty="0">
                 <a:solidFill>
                   <a:srgbClr val="000760"/>
                 </a:solidFill>

</xml_diff>